<commit_message>
Bugfix different colours in toc
</commit_message>
<xml_diff>
--- a/Manual.pptx
+++ b/Manual.pptx
@@ -248,7 +248,7 @@
           <a:p>
             <a:fld id="{7BF25980-F7F4-124A-900D-BDBB7D242AA6}" type="datetimeFigureOut">
               <a:rPr lang="de-DE" smtClean="0"/>
-              <a:t>18.07.21</a:t>
+              <a:t>11.11.21</a:t>
             </a:fld>
             <a:endParaRPr lang="de-DE"/>
           </a:p>
@@ -3141,7 +3141,7 @@
           <a:p>
             <a:fld id="{55A2F3A0-7A73-2D45-9E07-72576B75B68D}" type="datetime1">
               <a:rPr lang="de-DE" smtClean="0"/>
-              <a:t>18.07.21</a:t>
+              <a:t>11.11.21</a:t>
             </a:fld>
             <a:endParaRPr lang="de-DE"/>
           </a:p>
@@ -3287,7 +3287,7 @@
           <a:p>
             <a:fld id="{3CC5F95A-48DB-E74D-BF7C-B8ED8DA91F53}" type="datetime1">
               <a:rPr lang="de-DE" smtClean="0"/>
-              <a:t>18.07.21</a:t>
+              <a:t>11.11.21</a:t>
             </a:fld>
             <a:endParaRPr lang="de-DE"/>
           </a:p>
@@ -3443,7 +3443,7 @@
           <a:p>
             <a:fld id="{04F678E7-C573-4945-80D5-BA5AB792B3BD}" type="datetime1">
               <a:rPr lang="de-DE" smtClean="0"/>
-              <a:t>18.07.21</a:t>
+              <a:t>11.11.21</a:t>
             </a:fld>
             <a:endParaRPr lang="de-DE"/>
           </a:p>
@@ -3589,7 +3589,7 @@
           <a:p>
             <a:fld id="{99190FE3-8083-3D4C-83FA-5791A0CDF0FE}" type="datetime1">
               <a:rPr lang="de-DE" smtClean="0"/>
-              <a:t>18.07.21</a:t>
+              <a:t>11.11.21</a:t>
             </a:fld>
             <a:endParaRPr lang="de-DE"/>
           </a:p>
@@ -3838,7 +3838,7 @@
           <a:p>
             <a:fld id="{82BF8ACF-53CB-0C49-B862-8B8E645CFFA9}" type="datetime1">
               <a:rPr lang="de-DE" smtClean="0"/>
-              <a:t>18.07.21</a:t>
+              <a:t>11.11.21</a:t>
             </a:fld>
             <a:endParaRPr lang="de-DE"/>
           </a:p>
@@ -4022,7 +4022,7 @@
           <a:p>
             <a:fld id="{510A5A9C-F72F-A54C-9053-8FAE56582B71}" type="datetime1">
               <a:rPr lang="de-DE" smtClean="0"/>
-              <a:t>18.07.21</a:t>
+              <a:t>11.11.21</a:t>
             </a:fld>
             <a:endParaRPr lang="de-DE"/>
           </a:p>
@@ -4351,7 +4351,7 @@
           <a:p>
             <a:fld id="{2315DBC8-23E4-254D-AB0B-5CE718B63FA5}" type="datetime1">
               <a:rPr lang="de-DE" smtClean="0"/>
-              <a:t>18.07.21</a:t>
+              <a:t>11.11.21</a:t>
             </a:fld>
             <a:endParaRPr lang="de-DE"/>
           </a:p>
@@ -4469,7 +4469,7 @@
           <a:p>
             <a:fld id="{70A8BBF9-D9B9-F846-8E37-A506FBAEC0C7}" type="datetime1">
               <a:rPr lang="de-DE" smtClean="0"/>
-              <a:t>18.07.21</a:t>
+              <a:t>11.11.21</a:t>
             </a:fld>
             <a:endParaRPr lang="de-DE"/>
           </a:p>
@@ -4564,7 +4564,7 @@
           <a:p>
             <a:fld id="{C234C26B-49A8-2945-AE48-D17C1F05F099}" type="datetime1">
               <a:rPr lang="de-DE" smtClean="0"/>
-              <a:t>18.07.21</a:t>
+              <a:t>11.11.21</a:t>
             </a:fld>
             <a:endParaRPr lang="de-DE"/>
           </a:p>
@@ -4822,7 +4822,7 @@
           <a:p>
             <a:fld id="{3DEAABE5-5EB7-BB49-9FEE-49D554537008}" type="datetime1">
               <a:rPr lang="de-DE" smtClean="0"/>
-              <a:t>18.07.21</a:t>
+              <a:t>11.11.21</a:t>
             </a:fld>
             <a:endParaRPr lang="de-DE"/>
           </a:p>
@@ -5084,7 +5084,7 @@
           <a:p>
             <a:fld id="{3B736E65-69AB-824C-842F-785F42ACADC8}" type="datetime1">
               <a:rPr lang="de-DE" smtClean="0"/>
-              <a:t>18.07.21</a:t>
+              <a:t>11.11.21</a:t>
             </a:fld>
             <a:endParaRPr lang="de-DE"/>
           </a:p>
@@ -5273,7 +5273,7 @@
           <a:p>
             <a:fld id="{5EC599EE-6538-6B48-B83D-E54275A90EC8}" type="datetime1">
               <a:rPr lang="de-DE" smtClean="0"/>
-              <a:t>18.07.21</a:t>
+              <a:t>11.11.21</a:t>
             </a:fld>
             <a:endParaRPr lang="de-DE"/>
           </a:p>
@@ -18854,26 +18854,11 @@
                   </a:extLst>
                 </a:hlinkClick>
               </a:rPr>
-              <a:t>Weitere</a:t>
-            </a:r>
-            <a:r>
-              <a:rPr lang="de-DE" dirty="0">
-                <a:solidFill>
-                  <a:srgbClr val="6B6B6A"/>
-                </a:solidFill>
-                <a:hlinkClick r:id="rId19" action="ppaction://hlinksldjump">
-                  <a:extLst>
-                    <a:ext uri="{A12FA001-AC4F-418D-AE19-62706E023703}">
-                      <ahyp:hlinkClr xmlns:ahyp="http://schemas.microsoft.com/office/drawing/2018/hyperlinkcolor" val="tx"/>
-                    </a:ext>
-                  </a:extLst>
-                </a:hlinkClick>
-              </a:rPr>
-              <a:t> Zuordnungen</a:t>
+              <a:t>Weitere Zuordnungen</a:t>
             </a:r>
             <a:endParaRPr lang="de-DE" dirty="0">
               <a:solidFill>
-                <a:srgbClr val="6B6B6A"/>
+                <a:srgbClr val="36827D"/>
               </a:solidFill>
             </a:endParaRPr>
           </a:p>

</xml_diff>